<commit_message>
complete JSON data store for Select
</commit_message>
<xml_diff>
--- a/sprints/Sprint 4 - Nov 13 -  Nov 19 - Review.pptx
+++ b/sprints/Sprint 4 - Nov 13 -  Nov 19 - Review.pptx
@@ -198,7 +198,7 @@
           <a:p>
             <a:fld id="{68B00D8E-BD79-47BE-AA74-0D4716B611F1}" type="datetimeFigureOut">
               <a:rPr lang="en-US" smtClean="0"/>
-              <a:t>11/19/2016</a:t>
+              <a:t>11/25/2016</a:t>
             </a:fld>
             <a:endParaRPr lang="en-US"/>
           </a:p>
@@ -555,7 +555,7 @@
             <a:fld id="{81331B57-0BE5-4F82-AA58-76F53EFF3ADA}" type="datetime8">
               <a:rPr lang="en-US" smtClean="0"/>
               <a:pPr/>
-              <a:t>11/19/2016 12:00 PM</a:t>
+              <a:t>11/25/2016 8:55 AM</a:t>
             </a:fld>
             <a:endParaRPr lang="en-US" dirty="0"/>
           </a:p>
@@ -750,7 +750,7 @@
             <a:fld id="{81331B57-0BE5-4F82-AA58-76F53EFF3ADA}" type="datetime8">
               <a:rPr lang="en-US" smtClean="0"/>
               <a:pPr/>
-              <a:t>11/19/2016 12:00 PM</a:t>
+              <a:t>11/25/2016 8:55 AM</a:t>
             </a:fld>
             <a:endParaRPr lang="en-US"/>
           </a:p>
@@ -935,7 +935,7 @@
             <a:fld id="{81331B57-0BE5-4F82-AA58-76F53EFF3ADA}" type="datetime8">
               <a:rPr lang="en-US" smtClean="0"/>
               <a:pPr/>
-              <a:t>11/19/2016 12:00 PM</a:t>
+              <a:t>11/25/2016 8:55 AM</a:t>
             </a:fld>
             <a:endParaRPr lang="en-US"/>
           </a:p>
@@ -1120,7 +1120,7 @@
             <a:fld id="{81331B57-0BE5-4F82-AA58-76F53EFF3ADA}" type="datetime8">
               <a:rPr lang="en-US" smtClean="0"/>
               <a:pPr/>
-              <a:t>11/19/2016 12:00 PM</a:t>
+              <a:t>11/25/2016 8:55 AM</a:t>
             </a:fld>
             <a:endParaRPr lang="en-US"/>
           </a:p>
@@ -1305,7 +1305,7 @@
             <a:fld id="{81331B57-0BE5-4F82-AA58-76F53EFF3ADA}" type="datetime8">
               <a:rPr lang="en-US" smtClean="0"/>
               <a:pPr/>
-              <a:t>11/19/2016 12:00 PM</a:t>
+              <a:t>11/25/2016 8:55 AM</a:t>
             </a:fld>
             <a:endParaRPr lang="en-US"/>
           </a:p>
@@ -1490,7 +1490,7 @@
             <a:fld id="{81331B57-0BE5-4F82-AA58-76F53EFF3ADA}" type="datetime8">
               <a:rPr lang="en-US" smtClean="0"/>
               <a:pPr/>
-              <a:t>11/19/2016 12:00 PM</a:t>
+              <a:t>11/25/2016 8:55 AM</a:t>
             </a:fld>
             <a:endParaRPr lang="en-US"/>
           </a:p>
@@ -4801,15 +4801,7 @@
             </a:r>
             <a:r>
               <a:rPr lang="en-US" dirty="0" smtClean="0"/>
-              <a:t> – Sprint 4 </a:t>
-            </a:r>
-            <a:r>
-              <a:rPr lang="en-US" dirty="0" smtClean="0"/>
-              <a:t>Review</a:t>
-            </a:r>
-            <a:r>
-              <a:rPr lang="en-US" dirty="0" smtClean="0"/>
-              <a:t/>
+              <a:t> – Sprint 4 Review</a:t>
             </a:r>
             <a:br>
               <a:rPr lang="en-US" dirty="0" smtClean="0"/>
@@ -4937,7 +4929,7 @@
         <p:spPr>
           <a:xfrm>
             <a:off x="381000" y="990600"/>
-            <a:ext cx="8382000" cy="6647974"/>
+            <a:ext cx="8382000" cy="6580263"/>
           </a:xfrm>
         </p:spPr>
         <p:txBody>
@@ -4993,7 +4985,82 @@
                   </a:schemeClr>
                 </a:solidFill>
               </a:rPr>
-              <a:t>(3 story pts</a:t>
+              <a:t>(3 story pts) – 100%</a:t>
+            </a:r>
+            <a:endParaRPr lang="en-US" dirty="0" smtClean="0"/>
+          </a:p>
+          <a:p>
+            <a:r>
+              <a:rPr lang="en-US" dirty="0" smtClean="0"/>
+              <a:t>Complete Web Server Interface for current packages </a:t>
+            </a:r>
+            <a:r>
+              <a:rPr lang="en-US" dirty="0" smtClean="0">
+                <a:solidFill>
+                  <a:schemeClr val="tx1">
+                    <a:lumMod val="65000"/>
+                  </a:schemeClr>
+                </a:solidFill>
+              </a:rPr>
+              <a:t>(1 story pts) – 100%</a:t>
+            </a:r>
+            <a:endParaRPr lang="en-US" dirty="0" smtClean="0"/>
+          </a:p>
+          <a:p>
+            <a:r>
+              <a:rPr lang="en-US" dirty="0" smtClean="0"/>
+              <a:t>Complete Data Import Module </a:t>
+            </a:r>
+            <a:r>
+              <a:rPr lang="en-US" dirty="0" smtClean="0">
+                <a:solidFill>
+                  <a:schemeClr val="tx1">
+                    <a:lumMod val="65000"/>
+                  </a:schemeClr>
+                </a:solidFill>
+              </a:rPr>
+              <a:t>(3 story pts) – 75%</a:t>
+            </a:r>
+          </a:p>
+          <a:p>
+            <a:r>
+              <a:rPr lang="en-US" dirty="0" smtClean="0"/>
+              <a:t>Outside of Sprint: </a:t>
+            </a:r>
+          </a:p>
+          <a:p>
+            <a:pPr lvl="1"/>
+            <a:r>
+              <a:rPr lang="en-US" dirty="0" smtClean="0"/>
+              <a:t>Start JSON </a:t>
+            </a:r>
+            <a:r>
+              <a:rPr lang="en-US" dirty="0" err="1" smtClean="0"/>
+              <a:t>DataStore</a:t>
+            </a:r>
+            <a:r>
+              <a:rPr lang="en-US" dirty="0" smtClean="0"/>
+              <a:t> </a:t>
+            </a:r>
+            <a:r>
+              <a:rPr lang="en-US" dirty="0" smtClean="0">
+                <a:solidFill>
+                  <a:schemeClr val="tx1">
+                    <a:lumMod val="65000"/>
+                  </a:schemeClr>
+                </a:solidFill>
+              </a:rPr>
+              <a:t>(1 story </a:t>
+            </a:r>
+            <a:r>
+              <a:rPr lang="en-US" dirty="0" err="1" smtClean="0">
+                <a:solidFill>
+                  <a:schemeClr val="tx1">
+                    <a:lumMod val="65000"/>
+                  </a:schemeClr>
+                </a:solidFill>
+              </a:rPr>
+              <a:t>pt</a:t>
             </a:r>
             <a:r>
               <a:rPr lang="en-US" dirty="0" smtClean="0">
@@ -5005,13 +5072,17 @@
               </a:rPr>
               <a:t>) – 100%</a:t>
             </a:r>
-            <a:endParaRPr lang="en-US" dirty="0" smtClean="0"/>
-          </a:p>
-          <a:p>
-            <a:r>
-              <a:rPr lang="en-US" dirty="0" smtClean="0"/>
-              <a:t>Complete Web Server Interface for current packages </a:t>
-            </a:r>
+          </a:p>
+          <a:p>
+            <a:endParaRPr lang="en-US" dirty="0" smtClean="0">
+              <a:solidFill>
+                <a:schemeClr val="tx1">
+                  <a:lumMod val="65000"/>
+                </a:schemeClr>
+              </a:solidFill>
+            </a:endParaRPr>
+          </a:p>
+          <a:p>
             <a:r>
               <a:rPr lang="en-US" dirty="0" smtClean="0">
                 <a:solidFill>
@@ -5020,7 +5091,7 @@
                   </a:schemeClr>
                 </a:solidFill>
               </a:rPr>
-              <a:t>(1 story pts</a:t>
+              <a:t>Completed </a:t>
             </a:r>
             <a:r>
               <a:rPr lang="en-US" dirty="0" smtClean="0">
@@ -5030,85 +5101,27 @@
                   </a:schemeClr>
                 </a:solidFill>
               </a:rPr>
-              <a:t>) – 100%</a:t>
-            </a:r>
-            <a:endParaRPr lang="en-US" dirty="0" smtClean="0"/>
-          </a:p>
-          <a:p>
-            <a:r>
-              <a:rPr lang="en-US" dirty="0" smtClean="0"/>
-              <a:t>Complete Data Import Module </a:t>
-            </a:r>
-            <a:r>
-              <a:rPr lang="en-US" dirty="0" smtClean="0">
+              <a:t>Story Points</a:t>
+            </a:r>
+            <a:r>
+              <a:rPr lang="en-US" smtClean="0">
                 <a:solidFill>
                   <a:schemeClr val="tx1">
                     <a:lumMod val="65000"/>
                   </a:schemeClr>
                 </a:solidFill>
               </a:rPr>
-              <a:t>(3 story pts</a:t>
-            </a:r>
-            <a:r>
-              <a:rPr lang="en-US" dirty="0" smtClean="0">
+              <a:t>: </a:t>
+            </a:r>
+            <a:r>
+              <a:rPr lang="en-US" smtClean="0">
                 <a:solidFill>
                   <a:schemeClr val="tx1">
                     <a:lumMod val="65000"/>
                   </a:schemeClr>
                 </a:solidFill>
               </a:rPr>
-              <a:t>) – 75%</a:t>
-            </a:r>
-          </a:p>
-          <a:p>
-            <a:r>
-              <a:rPr lang="en-US" dirty="0" smtClean="0"/>
-              <a:t>Outside of Sprint: </a:t>
-            </a:r>
-          </a:p>
-          <a:p>
-            <a:pPr lvl="1"/>
-            <a:r>
-              <a:rPr lang="en-US" dirty="0" smtClean="0"/>
-              <a:t>Start JSON </a:t>
-            </a:r>
-            <a:r>
-              <a:rPr lang="en-US" dirty="0" err="1" smtClean="0"/>
-              <a:t>DataStore</a:t>
-            </a:r>
-            <a:r>
-              <a:rPr lang="en-US" dirty="0" smtClean="0"/>
-              <a:t> </a:t>
-            </a:r>
-            <a:r>
-              <a:rPr lang="en-US" dirty="0" smtClean="0">
-                <a:solidFill>
-                  <a:schemeClr val="tx1">
-                    <a:lumMod val="65000"/>
-                  </a:schemeClr>
-                </a:solidFill>
-              </a:rPr>
-              <a:t>(1 story </a:t>
-            </a:r>
-            <a:r>
-              <a:rPr lang="en-US" dirty="0" err="1" smtClean="0">
-                <a:solidFill>
-                  <a:schemeClr val="tx1">
-                    <a:lumMod val="65000"/>
-                  </a:schemeClr>
-                </a:solidFill>
-              </a:rPr>
-              <a:t>pt</a:t>
-            </a:r>
-            <a:r>
-              <a:rPr lang="en-US" dirty="0" smtClean="0">
-                <a:solidFill>
-                  <a:schemeClr val="tx1">
-                    <a:lumMod val="65000"/>
-                  </a:schemeClr>
-                </a:solidFill>
-              </a:rPr>
-              <a:t>) – 100%</a:t>
+              <a:t>6</a:t>
             </a:r>
             <a:endParaRPr lang="en-US" dirty="0" smtClean="0">
               <a:solidFill>
@@ -5117,37 +5130,6 @@
                 </a:schemeClr>
               </a:solidFill>
             </a:endParaRPr>
-          </a:p>
-          <a:p>
-            <a:endParaRPr lang="en-US" dirty="0" smtClean="0">
-              <a:solidFill>
-                <a:schemeClr val="tx1">
-                  <a:lumMod val="65000"/>
-                </a:schemeClr>
-              </a:solidFill>
-            </a:endParaRPr>
-          </a:p>
-          <a:p>
-            <a:r>
-              <a:rPr lang="en-US" dirty="0" smtClean="0">
-                <a:solidFill>
-                  <a:schemeClr val="tx1">
-                    <a:lumMod val="65000"/>
-                  </a:schemeClr>
-                </a:solidFill>
-              </a:rPr>
-              <a:t>Total </a:t>
-            </a:r>
-            <a:r>
-              <a:rPr lang="en-US" dirty="0" smtClean="0">
-                <a:solidFill>
-                  <a:schemeClr val="tx1">
-                    <a:lumMod val="65000"/>
-                  </a:schemeClr>
-                </a:solidFill>
-              </a:rPr>
-              <a:t>Story Points: 8</a:t>
-            </a:r>
           </a:p>
           <a:p>
             <a:endParaRPr lang="en-US" dirty="0"/>
@@ -5242,11 +5224,7 @@
           <a:p>
             <a:r>
               <a:rPr lang="en-US" dirty="0" smtClean="0"/>
-              <a:t>Finished </a:t>
-            </a:r>
-            <a:r>
-              <a:rPr lang="en-US" dirty="0" smtClean="0"/>
-              <a:t>Readme for </a:t>
+              <a:t>Finished Readme for </a:t>
             </a:r>
             <a:r>
               <a:rPr lang="en-US" dirty="0" err="1" smtClean="0"/>
@@ -5258,11 +5236,7 @@
             <a:pPr lvl="1"/>
             <a:r>
               <a:rPr lang="en-US" dirty="0" smtClean="0"/>
-              <a:t>More details on web server </a:t>
-            </a:r>
-            <a:r>
-              <a:rPr lang="en-US" dirty="0" smtClean="0"/>
-              <a:t>interface and </a:t>
+              <a:t>More details on web server interface and </a:t>
             </a:r>
             <a:r>
               <a:rPr lang="en-US" dirty="0" err="1" smtClean="0"/>
@@ -5272,7 +5246,6 @@
               <a:rPr lang="en-US" dirty="0" smtClean="0"/>
               <a:t> build</a:t>
             </a:r>
-            <a:endParaRPr lang="en-US" dirty="0" smtClean="0"/>
           </a:p>
           <a:p>
             <a:pPr marL="0" indent="0">
@@ -5283,11 +5256,7 @@
           <a:p>
             <a:r>
               <a:rPr lang="en-US" dirty="0" smtClean="0"/>
-              <a:t>Expanded </a:t>
-            </a:r>
-            <a:r>
-              <a:rPr lang="en-US" dirty="0" smtClean="0"/>
-              <a:t>e2e Design Diagram</a:t>
+              <a:t>Expanded e2e Design Diagram</a:t>
             </a:r>
           </a:p>
           <a:p>
@@ -5399,11 +5368,7 @@
             <a:pPr lvl="1"/>
             <a:r>
               <a:rPr lang="en-US" dirty="0" smtClean="0"/>
-              <a:t>Added Supp</a:t>
-            </a:r>
-            <a:r>
-              <a:rPr lang="en-US" dirty="0" smtClean="0"/>
-              <a:t>ort for Parsing Linked CSV support and retaining (prolog) metadata.</a:t>
+              <a:t>Added Support for Parsing Linked CSV support and retaining (prolog) metadata.</a:t>
             </a:r>
           </a:p>
           <a:p>
@@ -5428,19 +5393,13 @@
               <a:rPr lang="en-US" dirty="0" smtClean="0"/>
               <a:t> Data Model.</a:t>
             </a:r>
-            <a:endParaRPr lang="en-US" dirty="0" smtClean="0"/>
           </a:p>
           <a:p>
             <a:pPr lvl="1"/>
             <a:r>
               <a:rPr lang="en-US" dirty="0" smtClean="0"/>
-              <a:t>Added </a:t>
-            </a:r>
-            <a:r>
-              <a:rPr lang="en-US" dirty="0" smtClean="0"/>
-              <a:t>Unit Tests </a:t>
-            </a:r>
-            <a:endParaRPr lang="en-US" dirty="0" smtClean="0"/>
+              <a:t>Added Unit Tests </a:t>
+            </a:r>
           </a:p>
           <a:p>
             <a:pPr lvl="1"/>
@@ -5656,11 +5615,7 @@
           <a:p>
             <a:r>
               <a:rPr lang="en-US" dirty="0" smtClean="0"/>
-              <a:t>Added </a:t>
-            </a:r>
-            <a:r>
-              <a:rPr lang="en-US" dirty="0" smtClean="0"/>
-              <a:t>Additional Interfaces for Schemas</a:t>
+              <a:t>Added Additional Interfaces for Schemas</a:t>
             </a:r>
           </a:p>
           <a:p>
@@ -5679,11 +5634,7 @@
           <a:p>
             <a:r>
               <a:rPr lang="en-US" dirty="0" smtClean="0"/>
-              <a:t>Connected </a:t>
-            </a:r>
-            <a:r>
-              <a:rPr lang="en-US" dirty="0" smtClean="0"/>
-              <a:t>to Parse and Data packages</a:t>
+              <a:t>Connected to Parse and Data packages</a:t>
             </a:r>
           </a:p>
           <a:p>

</xml_diff>